<commit_message>
update font in  scratch
</commit_message>
<xml_diff>
--- a/img/sketch/app_sketch.pptx
+++ b/img/sketch/app_sketch.pptx
@@ -3967,7 +3967,7 @@
           <p:cNvPr id="27" name="Rectangle 26">
             <a:extLst>
               <a:ext uri="{FF2B5EF4-FFF2-40B4-BE49-F238E27FC236}">
-                <a16:creationId xmlns="" xmlns:a16="http://schemas.microsoft.com/office/drawing/2014/main" id="{D7D4A0B3-60F7-4EC4-80FA-ABEF393D61C7}"/>
+                <a16:creationId xmlns:a16="http://schemas.microsoft.com/office/drawing/2014/main" xmlns="" id="{D7D4A0B3-60F7-4EC4-80FA-ABEF393D61C7}"/>
               </a:ext>
             </a:extLst>
           </p:cNvPr>
@@ -4019,7 +4019,7 @@
           <p:cNvPr id="76" name="Straight Arrow Connector 75">
             <a:extLst>
               <a:ext uri="{FF2B5EF4-FFF2-40B4-BE49-F238E27FC236}">
-                <a16:creationId xmlns="" xmlns:a16="http://schemas.microsoft.com/office/drawing/2014/main" id="{27E91071-DC6B-4FAD-BAAF-DAA1738C6E03}"/>
+                <a16:creationId xmlns:a16="http://schemas.microsoft.com/office/drawing/2014/main" xmlns="" id="{27E91071-DC6B-4FAD-BAAF-DAA1738C6E03}"/>
               </a:ext>
             </a:extLst>
           </p:cNvPr>
@@ -4063,7 +4063,7 @@
           <p:cNvPr id="77" name="TextBox 76">
             <a:extLst>
               <a:ext uri="{FF2B5EF4-FFF2-40B4-BE49-F238E27FC236}">
-                <a16:creationId xmlns="" xmlns:a16="http://schemas.microsoft.com/office/drawing/2014/main" id="{CE8C0DCD-7D27-4BEA-871C-E5863C238267}"/>
+                <a16:creationId xmlns:a16="http://schemas.microsoft.com/office/drawing/2014/main" xmlns="" id="{CE8C0DCD-7D27-4BEA-871C-E5863C238267}"/>
               </a:ext>
             </a:extLst>
           </p:cNvPr>
@@ -4072,7 +4072,7 @@
         </p:nvSpPr>
         <p:spPr>
           <a:xfrm>
-            <a:off x="1544368" y="1274337"/>
+            <a:off x="1482820" y="1307856"/>
             <a:ext cx="1409212" cy="369332"/>
           </a:xfrm>
           <a:prstGeom prst="rect">
@@ -4087,7 +4087,11 @@
           <a:lstStyle/>
           <a:p>
             <a:r>
-              <a:rPr lang="en-US" dirty="0"/>
+              <a:rPr lang="en-US" dirty="0">
+                <a:latin typeface="Chalkboard" charset="0"/>
+                <a:ea typeface="Chalkboard" charset="0"/>
+                <a:cs typeface="Chalkboard" charset="0"/>
+              </a:rPr>
               <a:t>Genres</a:t>
             </a:r>
           </a:p>
@@ -4098,7 +4102,7 @@
           <p:cNvPr id="80" name="TextBox 79">
             <a:extLst>
               <a:ext uri="{FF2B5EF4-FFF2-40B4-BE49-F238E27FC236}">
-                <a16:creationId xmlns="" xmlns:a16="http://schemas.microsoft.com/office/drawing/2014/main" id="{E86AE56D-87DB-4A7B-96B7-0DC85D6B08B9}"/>
+                <a16:creationId xmlns:a16="http://schemas.microsoft.com/office/drawing/2014/main" xmlns="" id="{E86AE56D-87DB-4A7B-96B7-0DC85D6B08B9}"/>
               </a:ext>
             </a:extLst>
           </p:cNvPr>
@@ -4123,7 +4127,9 @@
           <a:p>
             <a:r>
               <a:rPr lang="en-US" sz="1600" b="1" dirty="0">
-                <a:latin typeface="Ink Free" panose="03080402000500000000" pitchFamily="66" charset="0"/>
+                <a:latin typeface="Bradley Hand" charset="0"/>
+                <a:ea typeface="Bradley Hand" charset="0"/>
+                <a:cs typeface="Bradley Hand" charset="0"/>
               </a:rPr>
               <a:t>Dropdown </a:t>
             </a:r>
@@ -4131,7 +4137,9 @@
           <a:p>
             <a:r>
               <a:rPr lang="en-US" sz="1600" b="1" dirty="0">
-                <a:latin typeface="Ink Free" panose="03080402000500000000" pitchFamily="66" charset="0"/>
+                <a:latin typeface="Bradley Hand" charset="0"/>
+                <a:ea typeface="Bradley Hand" charset="0"/>
+                <a:cs typeface="Bradley Hand" charset="0"/>
               </a:rPr>
               <a:t>Menu </a:t>
             </a:r>
@@ -4143,7 +4151,7 @@
           <p:cNvPr id="86" name="Rectangle: Rounded Corners 85">
             <a:extLst>
               <a:ext uri="{FF2B5EF4-FFF2-40B4-BE49-F238E27FC236}">
-                <a16:creationId xmlns="" xmlns:a16="http://schemas.microsoft.com/office/drawing/2014/main" id="{D0943646-EAEE-40B1-9FC5-0ED8510A5799}"/>
+                <a16:creationId xmlns:a16="http://schemas.microsoft.com/office/drawing/2014/main" xmlns="" id="{D0943646-EAEE-40B1-9FC5-0ED8510A5799}"/>
               </a:ext>
             </a:extLst>
           </p:cNvPr>
@@ -4197,7 +4205,7 @@
           <p:cNvPr id="88" name="Rectangle: Rounded Corners 87">
             <a:extLst>
               <a:ext uri="{FF2B5EF4-FFF2-40B4-BE49-F238E27FC236}">
-                <a16:creationId xmlns="" xmlns:a16="http://schemas.microsoft.com/office/drawing/2014/main" id="{03102BC5-3231-40BD-AF3F-E042D4C35AA0}"/>
+                <a16:creationId xmlns:a16="http://schemas.microsoft.com/office/drawing/2014/main" xmlns="" id="{03102BC5-3231-40BD-AF3F-E042D4C35AA0}"/>
               </a:ext>
             </a:extLst>
           </p:cNvPr>
@@ -4251,7 +4259,7 @@
           <p:cNvPr id="89" name="Straight Arrow Connector 88">
             <a:extLst>
               <a:ext uri="{FF2B5EF4-FFF2-40B4-BE49-F238E27FC236}">
-                <a16:creationId xmlns="" xmlns:a16="http://schemas.microsoft.com/office/drawing/2014/main" id="{82F4F613-91FC-4731-9ECC-6E5BCDD64878}"/>
+                <a16:creationId xmlns:a16="http://schemas.microsoft.com/office/drawing/2014/main" xmlns="" id="{82F4F613-91FC-4731-9ECC-6E5BCDD64878}"/>
               </a:ext>
             </a:extLst>
           </p:cNvPr>
@@ -4295,7 +4303,7 @@
           <p:cNvPr id="103" name="Oval 102">
             <a:extLst>
               <a:ext uri="{FF2B5EF4-FFF2-40B4-BE49-F238E27FC236}">
-                <a16:creationId xmlns="" xmlns:a16="http://schemas.microsoft.com/office/drawing/2014/main" id="{8321FC2E-C92C-4EE9-8E19-198F1F6880E6}"/>
+                <a16:creationId xmlns:a16="http://schemas.microsoft.com/office/drawing/2014/main" xmlns="" id="{8321FC2E-C92C-4EE9-8E19-198F1F6880E6}"/>
               </a:ext>
             </a:extLst>
           </p:cNvPr>
@@ -4349,7 +4357,7 @@
           <p:cNvPr id="112" name="Oval 111">
             <a:extLst>
               <a:ext uri="{FF2B5EF4-FFF2-40B4-BE49-F238E27FC236}">
-                <a16:creationId xmlns="" xmlns:a16="http://schemas.microsoft.com/office/drawing/2014/main" id="{3CA0C167-1E12-4746-AC9A-6E0DEFFB4108}"/>
+                <a16:creationId xmlns:a16="http://schemas.microsoft.com/office/drawing/2014/main" xmlns="" id="{3CA0C167-1E12-4746-AC9A-6E0DEFFB4108}"/>
               </a:ext>
             </a:extLst>
           </p:cNvPr>
@@ -4569,7 +4577,7 @@
             <p:cNvPr id="108" name="Oval 107">
               <a:extLst>
                 <a:ext uri="{FF2B5EF4-FFF2-40B4-BE49-F238E27FC236}">
-                  <a16:creationId xmlns="" xmlns:a16="http://schemas.microsoft.com/office/drawing/2014/main" id="{FCB7EBE7-71D0-4252-911A-C37824B82898}"/>
+                  <a16:creationId xmlns:a16="http://schemas.microsoft.com/office/drawing/2014/main" xmlns="" id="{FCB7EBE7-71D0-4252-911A-C37824B82898}"/>
                 </a:ext>
               </a:extLst>
             </p:cNvPr>
@@ -4623,7 +4631,7 @@
             <p:cNvPr id="109" name="Oval 108">
               <a:extLst>
                 <a:ext uri="{FF2B5EF4-FFF2-40B4-BE49-F238E27FC236}">
-                  <a16:creationId xmlns="" xmlns:a16="http://schemas.microsoft.com/office/drawing/2014/main" id="{8F69B8C9-9AC1-4A07-8A38-C03CE4C37FB7}"/>
+                  <a16:creationId xmlns:a16="http://schemas.microsoft.com/office/drawing/2014/main" xmlns="" id="{8F69B8C9-9AC1-4A07-8A38-C03CE4C37FB7}"/>
                 </a:ext>
               </a:extLst>
             </p:cNvPr>
@@ -4677,7 +4685,7 @@
             <p:cNvPr id="110" name="Oval 109">
               <a:extLst>
                 <a:ext uri="{FF2B5EF4-FFF2-40B4-BE49-F238E27FC236}">
-                  <a16:creationId xmlns="" xmlns:a16="http://schemas.microsoft.com/office/drawing/2014/main" id="{2A3D726D-570B-4DC9-9D07-972D0BC95103}"/>
+                  <a16:creationId xmlns:a16="http://schemas.microsoft.com/office/drawing/2014/main" xmlns="" id="{2A3D726D-570B-4DC9-9D07-972D0BC95103}"/>
                 </a:ext>
               </a:extLst>
             </p:cNvPr>
@@ -4731,7 +4739,7 @@
             <p:cNvPr id="111" name="Oval 110">
               <a:extLst>
                 <a:ext uri="{FF2B5EF4-FFF2-40B4-BE49-F238E27FC236}">
-                  <a16:creationId xmlns="" xmlns:a16="http://schemas.microsoft.com/office/drawing/2014/main" id="{70A84870-9F8B-4A17-8F4D-91B56E7B8E11}"/>
+                  <a16:creationId xmlns:a16="http://schemas.microsoft.com/office/drawing/2014/main" xmlns="" id="{70A84870-9F8B-4A17-8F4D-91B56E7B8E11}"/>
                 </a:ext>
               </a:extLst>
             </p:cNvPr>
@@ -4785,7 +4793,7 @@
             <p:cNvPr id="115" name="Oval 114">
               <a:extLst>
                 <a:ext uri="{FF2B5EF4-FFF2-40B4-BE49-F238E27FC236}">
-                  <a16:creationId xmlns="" xmlns:a16="http://schemas.microsoft.com/office/drawing/2014/main" id="{572127C1-6D61-4C2E-8059-598212BB99CF}"/>
+                  <a16:creationId xmlns:a16="http://schemas.microsoft.com/office/drawing/2014/main" xmlns="" id="{572127C1-6D61-4C2E-8059-598212BB99CF}"/>
                 </a:ext>
               </a:extLst>
             </p:cNvPr>
@@ -4844,9 +4852,9 @@
         <p:grpSpPr>
           <a:xfrm>
             <a:off x="5991322" y="1396805"/>
-            <a:ext cx="4627575" cy="2328102"/>
+            <a:ext cx="4697004" cy="2328102"/>
             <a:chOff x="8127892" y="480177"/>
-            <a:chExt cx="4249787" cy="2328102"/>
+            <a:chExt cx="4313548" cy="2328102"/>
           </a:xfrm>
         </p:grpSpPr>
         <p:cxnSp>
@@ -4854,7 +4862,7 @@
             <p:cNvPr id="104" name="Straight Connector 103">
               <a:extLst>
                 <a:ext uri="{FF2B5EF4-FFF2-40B4-BE49-F238E27FC236}">
-                  <a16:creationId xmlns="" xmlns:a16="http://schemas.microsoft.com/office/drawing/2014/main" id="{5F74147B-BED1-43A8-9B93-DD26CF0362C0}"/>
+                  <a16:creationId xmlns:a16="http://schemas.microsoft.com/office/drawing/2014/main" xmlns="" id="{5F74147B-BED1-43A8-9B93-DD26CF0362C0}"/>
                 </a:ext>
               </a:extLst>
             </p:cNvPr>
@@ -4898,7 +4906,7 @@
             <p:cNvPr id="106" name="Straight Connector 105">
               <a:extLst>
                 <a:ext uri="{FF2B5EF4-FFF2-40B4-BE49-F238E27FC236}">
-                  <a16:creationId xmlns="" xmlns:a16="http://schemas.microsoft.com/office/drawing/2014/main" id="{11A18E14-59E9-4553-BB3B-F3491D39C75F}"/>
+                  <a16:creationId xmlns:a16="http://schemas.microsoft.com/office/drawing/2014/main" xmlns="" id="{11A18E14-59E9-4553-BB3B-F3491D39C75F}"/>
                 </a:ext>
               </a:extLst>
             </p:cNvPr>
@@ -4946,9 +4954,9 @@
           <p:grpSpPr>
             <a:xfrm>
               <a:off x="8127892" y="480177"/>
-              <a:ext cx="4249787" cy="2328102"/>
+              <a:ext cx="4313548" cy="2328102"/>
               <a:chOff x="6039426" y="3525793"/>
-              <a:chExt cx="4249787" cy="2328102"/>
+              <a:chExt cx="4313548" cy="2328102"/>
             </a:xfrm>
           </p:grpSpPr>
           <p:grpSp>
@@ -5103,7 +5111,7 @@
               <p:cNvPr id="91" name="TextBox 90">
                 <a:extLst>
                   <a:ext uri="{FF2B5EF4-FFF2-40B4-BE49-F238E27FC236}">
-                    <a16:creationId xmlns="" xmlns:a16="http://schemas.microsoft.com/office/drawing/2014/main" id="{FEC47976-6018-44C2-85CA-FE09627F731F}"/>
+                    <a16:creationId xmlns:a16="http://schemas.microsoft.com/office/drawing/2014/main" xmlns="" id="{FEC47976-6018-44C2-85CA-FE09627F731F}"/>
                   </a:ext>
                 </a:extLst>
               </p:cNvPr>
@@ -5112,7 +5120,7 @@
             </p:nvSpPr>
             <p:spPr>
               <a:xfrm>
-                <a:off x="7500826" y="5006121"/>
+                <a:off x="7564587" y="5063190"/>
                 <a:ext cx="2788387" cy="338554"/>
               </a:xfrm>
               <a:prstGeom prst="rect">
@@ -5128,7 +5136,9 @@
               <a:p>
                 <a:r>
                   <a:rPr lang="en-US" sz="1600" b="1" dirty="0">
-                    <a:latin typeface="Ink Free" panose="03080402000500000000" pitchFamily="66" charset="0"/>
+                    <a:latin typeface="Bradley Hand" charset="0"/>
+                    <a:ea typeface="Bradley Hand" charset="0"/>
+                    <a:cs typeface="Bradley Hand" charset="0"/>
                   </a:rPr>
                   <a:t>Show Tooltip on Brush</a:t>
                 </a:r>
@@ -5140,7 +5150,7 @@
               <p:cNvPr id="92" name="Speech Bubble: Rectangle 91">
                 <a:extLst>
                   <a:ext uri="{FF2B5EF4-FFF2-40B4-BE49-F238E27FC236}">
-                    <a16:creationId xmlns="" xmlns:a16="http://schemas.microsoft.com/office/drawing/2014/main" id="{0EBE6E0A-FFFC-41DD-8175-54097C406DC3}"/>
+                    <a16:creationId xmlns:a16="http://schemas.microsoft.com/office/drawing/2014/main" xmlns="" id="{0EBE6E0A-FFFC-41DD-8175-54097C406DC3}"/>
                   </a:ext>
                 </a:extLst>
               </p:cNvPr>
@@ -5192,7 +5202,7 @@
               <p:cNvPr id="99" name="Oval 98">
                 <a:extLst>
                   <a:ext uri="{FF2B5EF4-FFF2-40B4-BE49-F238E27FC236}">
-                    <a16:creationId xmlns="" xmlns:a16="http://schemas.microsoft.com/office/drawing/2014/main" id="{77A01DE3-D264-4442-93A1-6D2568246996}"/>
+                    <a16:creationId xmlns:a16="http://schemas.microsoft.com/office/drawing/2014/main" xmlns="" id="{77A01DE3-D264-4442-93A1-6D2568246996}"/>
                   </a:ext>
                 </a:extLst>
               </p:cNvPr>
@@ -5246,7 +5256,7 @@
               <p:cNvPr id="100" name="Oval 99">
                 <a:extLst>
                   <a:ext uri="{FF2B5EF4-FFF2-40B4-BE49-F238E27FC236}">
-                    <a16:creationId xmlns="" xmlns:a16="http://schemas.microsoft.com/office/drawing/2014/main" id="{8C0DA4ED-39FD-4377-8220-4CF979EFB3DA}"/>
+                    <a16:creationId xmlns:a16="http://schemas.microsoft.com/office/drawing/2014/main" xmlns="" id="{8C0DA4ED-39FD-4377-8220-4CF979EFB3DA}"/>
                   </a:ext>
                 </a:extLst>
               </p:cNvPr>
@@ -5300,7 +5310,7 @@
               <p:cNvPr id="101" name="Oval 100">
                 <a:extLst>
                   <a:ext uri="{FF2B5EF4-FFF2-40B4-BE49-F238E27FC236}">
-                    <a16:creationId xmlns="" xmlns:a16="http://schemas.microsoft.com/office/drawing/2014/main" id="{0CA6F27A-B930-454D-82BD-58102846F6CD}"/>
+                    <a16:creationId xmlns:a16="http://schemas.microsoft.com/office/drawing/2014/main" xmlns="" id="{0CA6F27A-B930-454D-82BD-58102846F6CD}"/>
                   </a:ext>
                 </a:extLst>
               </p:cNvPr>
@@ -5354,7 +5364,7 @@
               <p:cNvPr id="102" name="Oval 101">
                 <a:extLst>
                   <a:ext uri="{FF2B5EF4-FFF2-40B4-BE49-F238E27FC236}">
-                    <a16:creationId xmlns="" xmlns:a16="http://schemas.microsoft.com/office/drawing/2014/main" id="{AED01084-D69F-4D3E-BC42-AA59AA2C3BE2}"/>
+                    <a16:creationId xmlns:a16="http://schemas.microsoft.com/office/drawing/2014/main" xmlns="" id="{AED01084-D69F-4D3E-BC42-AA59AA2C3BE2}"/>
                   </a:ext>
                 </a:extLst>
               </p:cNvPr>
@@ -5408,7 +5418,7 @@
               <p:cNvPr id="116" name="Oval 115">
                 <a:extLst>
                   <a:ext uri="{FF2B5EF4-FFF2-40B4-BE49-F238E27FC236}">
-                    <a16:creationId xmlns="" xmlns:a16="http://schemas.microsoft.com/office/drawing/2014/main" id="{810B726E-36D3-4B68-A09E-D5B39BC38494}"/>
+                    <a16:creationId xmlns:a16="http://schemas.microsoft.com/office/drawing/2014/main" xmlns="" id="{810B726E-36D3-4B68-A09E-D5B39BC38494}"/>
                   </a:ext>
                 </a:extLst>
               </p:cNvPr>
@@ -5462,7 +5472,7 @@
               <p:cNvPr id="117" name="Straight Arrow Connector 116">
                 <a:extLst>
                   <a:ext uri="{FF2B5EF4-FFF2-40B4-BE49-F238E27FC236}">
-                    <a16:creationId xmlns="" xmlns:a16="http://schemas.microsoft.com/office/drawing/2014/main" id="{38B89455-5A96-420F-8515-7C6054D245C7}"/>
+                    <a16:creationId xmlns:a16="http://schemas.microsoft.com/office/drawing/2014/main" xmlns="" id="{38B89455-5A96-420F-8515-7C6054D245C7}"/>
                   </a:ext>
                 </a:extLst>
               </p:cNvPr>
@@ -5508,7 +5518,7 @@
           <p:cNvPr id="119" name="TextBox 118">
             <a:extLst>
               <a:ext uri="{FF2B5EF4-FFF2-40B4-BE49-F238E27FC236}">
-                <a16:creationId xmlns="" xmlns:a16="http://schemas.microsoft.com/office/drawing/2014/main" id="{8376F348-E111-414B-A05E-8684219AF14C}"/>
+                <a16:creationId xmlns:a16="http://schemas.microsoft.com/office/drawing/2014/main" xmlns="" id="{8376F348-E111-414B-A05E-8684219AF14C}"/>
               </a:ext>
             </a:extLst>
           </p:cNvPr>
@@ -5533,7 +5543,9 @@
           <a:p>
             <a:r>
               <a:rPr lang="en-US" sz="1600" b="1" dirty="0">
-                <a:latin typeface="Ink Free" panose="03080402000500000000" pitchFamily="66" charset="0"/>
+                <a:latin typeface="Bradley Hand" charset="0"/>
+                <a:ea typeface="Bradley Hand" charset="0"/>
+                <a:cs typeface="Bradley Hand" charset="0"/>
               </a:rPr>
               <a:t>Scroll Bar</a:t>
             </a:r>
@@ -5548,7 +5560,7 @@
         </p:nvCxnSpPr>
         <p:spPr>
           <a:xfrm>
-            <a:off x="1155440" y="1274337"/>
+            <a:off x="1140728" y="1226930"/>
             <a:ext cx="10758692" cy="0"/>
           </a:xfrm>
           <a:prstGeom prst="line">
@@ -5594,17 +5606,29 @@
           <a:p>
             <a:pPr algn="ctr"/>
             <a:r>
-              <a:rPr lang="en-US" dirty="0" smtClean="0"/>
+              <a:rPr lang="en-US" dirty="0" smtClean="0">
+                <a:latin typeface="Chalkboard" charset="0"/>
+                <a:ea typeface="Chalkboard" charset="0"/>
+                <a:cs typeface="Chalkboard" charset="0"/>
+              </a:rPr>
               <a:t>Directors Production Tracker</a:t>
             </a:r>
           </a:p>
           <a:p>
             <a:pPr algn="ctr"/>
             <a:r>
-              <a:rPr lang="en-US" sz="1200" dirty="0" smtClean="0"/>
+              <a:rPr lang="en-US" sz="1200" dirty="0" smtClean="0">
+                <a:latin typeface="Ayuthaya" charset="-34"/>
+                <a:ea typeface="Ayuthaya" charset="-34"/>
+                <a:cs typeface="Ayuthaya" charset="-34"/>
+              </a:rPr>
               <a:t>Website Description</a:t>
             </a:r>
-            <a:endParaRPr lang="en-US" sz="1200" dirty="0"/>
+            <a:endParaRPr lang="en-US" sz="1200" dirty="0">
+              <a:latin typeface="Ayuthaya" charset="-34"/>
+              <a:ea typeface="Ayuthaya" charset="-34"/>
+              <a:cs typeface="Ayuthaya" charset="-34"/>
+            </a:endParaRPr>
           </a:p>
         </p:txBody>
       </p:sp>
@@ -5670,8 +5694,8 @@
         </p:nvSpPr>
         <p:spPr>
           <a:xfrm>
-            <a:off x="10063771" y="1775448"/>
-            <a:ext cx="993696" cy="369332"/>
+            <a:off x="10048898" y="1775479"/>
+            <a:ext cx="1084189" cy="369332"/>
           </a:xfrm>
           <a:prstGeom prst="rect">
             <a:avLst/>
@@ -5685,10 +5709,18 @@
           <a:lstStyle/>
           <a:p>
             <a:r>
-              <a:rPr lang="en-US" smtClean="0"/>
+              <a:rPr lang="en-US" dirty="0" smtClean="0">
+                <a:latin typeface="Chalkboard" charset="0"/>
+                <a:ea typeface="Chalkboard" charset="0"/>
+                <a:cs typeface="Chalkboard" charset="0"/>
+              </a:rPr>
               <a:t>Director</a:t>
             </a:r>
-            <a:endParaRPr lang="en-US"/>
+            <a:endParaRPr lang="en-US" dirty="0">
+              <a:latin typeface="Chalkboard" charset="0"/>
+              <a:ea typeface="Chalkboard" charset="0"/>
+              <a:cs typeface="Chalkboard" charset="0"/>
+            </a:endParaRPr>
           </a:p>
         </p:txBody>
       </p:sp>
@@ -5697,7 +5729,7 @@
           <p:cNvPr id="94" name="Oval 93">
             <a:extLst>
               <a:ext uri="{FF2B5EF4-FFF2-40B4-BE49-F238E27FC236}">
-                <a16:creationId xmlns="" xmlns:a16="http://schemas.microsoft.com/office/drawing/2014/main" id="{8C0DA4ED-39FD-4377-8220-4CF979EFB3DA}"/>
+                <a16:creationId xmlns:a16="http://schemas.microsoft.com/office/drawing/2014/main" xmlns="" id="{8C0DA4ED-39FD-4377-8220-4CF979EFB3DA}"/>
               </a:ext>
             </a:extLst>
           </p:cNvPr>
@@ -5751,7 +5783,7 @@
           <p:cNvPr id="95" name="Oval 94">
             <a:extLst>
               <a:ext uri="{FF2B5EF4-FFF2-40B4-BE49-F238E27FC236}">
-                <a16:creationId xmlns="" xmlns:a16="http://schemas.microsoft.com/office/drawing/2014/main" id="{8C0DA4ED-39FD-4377-8220-4CF979EFB3DA}"/>
+                <a16:creationId xmlns:a16="http://schemas.microsoft.com/office/drawing/2014/main" xmlns="" id="{8C0DA4ED-39FD-4377-8220-4CF979EFB3DA}"/>
               </a:ext>
             </a:extLst>
           </p:cNvPr>
@@ -5805,7 +5837,7 @@
           <p:cNvPr id="98" name="Oval 97">
             <a:extLst>
               <a:ext uri="{FF2B5EF4-FFF2-40B4-BE49-F238E27FC236}">
-                <a16:creationId xmlns="" xmlns:a16="http://schemas.microsoft.com/office/drawing/2014/main" id="{8C0DA4ED-39FD-4377-8220-4CF979EFB3DA}"/>
+                <a16:creationId xmlns:a16="http://schemas.microsoft.com/office/drawing/2014/main" xmlns="" id="{8C0DA4ED-39FD-4377-8220-4CF979EFB3DA}"/>
               </a:ext>
             </a:extLst>
           </p:cNvPr>
@@ -5859,7 +5891,7 @@
           <p:cNvPr id="105" name="Straight Arrow Connector 104">
             <a:extLst>
               <a:ext uri="{FF2B5EF4-FFF2-40B4-BE49-F238E27FC236}">
-                <a16:creationId xmlns="" xmlns:a16="http://schemas.microsoft.com/office/drawing/2014/main" id="{C821B187-5F90-40F9-8DE6-E44B02A4C3BF}"/>
+                <a16:creationId xmlns:a16="http://schemas.microsoft.com/office/drawing/2014/main" xmlns="" id="{C821B187-5F90-40F9-8DE6-E44B02A4C3BF}"/>
               </a:ext>
             </a:extLst>
           </p:cNvPr>
@@ -5903,7 +5935,7 @@
           <p:cNvPr id="107" name="TextBox 106">
             <a:extLst>
               <a:ext uri="{FF2B5EF4-FFF2-40B4-BE49-F238E27FC236}">
-                <a16:creationId xmlns="" xmlns:a16="http://schemas.microsoft.com/office/drawing/2014/main" id="{6BFE790D-F0D2-438C-8FE7-0CDDEB47B4F8}"/>
+                <a16:creationId xmlns:a16="http://schemas.microsoft.com/office/drawing/2014/main" xmlns="" id="{6BFE790D-F0D2-438C-8FE7-0CDDEB47B4F8}"/>
               </a:ext>
             </a:extLst>
           </p:cNvPr>
@@ -5912,7 +5944,7 @@
         </p:nvSpPr>
         <p:spPr>
           <a:xfrm>
-            <a:off x="10638434" y="3324035"/>
+            <a:off x="10623077" y="3222453"/>
             <a:ext cx="2788387" cy="338554"/>
           </a:xfrm>
           <a:prstGeom prst="rect">
@@ -5927,10 +5959,18 @@
           <a:lstStyle/>
           <a:p>
             <a:r>
-              <a:rPr lang="en-US" sz="1600" b="1" smtClean="0">
+              <a:rPr lang="en-US" sz="1600" b="1" dirty="0" smtClean="0">
+                <a:latin typeface="Bradley Hand" charset="0"/>
+                <a:ea typeface="Bradley Hand" charset="0"/>
+                <a:cs typeface="Bradley Hand" charset="0"/>
+              </a:rPr>
+              <a:t>Legend</a:t>
+            </a:r>
+            <a:r>
+              <a:rPr lang="en-US" sz="1600" b="1" dirty="0" smtClean="0">
                 <a:latin typeface="Ink Free" panose="03080402000500000000" pitchFamily="66" charset="0"/>
               </a:rPr>
-              <a:t>Legend </a:t>
+              <a:t> </a:t>
             </a:r>
             <a:endParaRPr lang="en-US" sz="1600" b="1" dirty="0">
               <a:latin typeface="Ink Free" panose="03080402000500000000" pitchFamily="66" charset="0"/>
@@ -6078,10 +6118,18 @@
           <a:p>
             <a:pPr algn="ctr"/>
             <a:r>
-              <a:rPr lang="en-US" sz="1400" dirty="0" smtClean="0"/>
+              <a:rPr lang="en-US" sz="1400" dirty="0" smtClean="0">
+                <a:latin typeface="Abadi MT Condensed Light" charset="0"/>
+                <a:ea typeface="Abadi MT Condensed Light" charset="0"/>
+                <a:cs typeface="Abadi MT Condensed Light" charset="0"/>
+              </a:rPr>
               <a:t>Functionality Introduction</a:t>
             </a:r>
-            <a:endParaRPr lang="en-US" sz="1400" dirty="0"/>
+            <a:endParaRPr lang="en-US" sz="1400" dirty="0">
+              <a:latin typeface="Abadi MT Condensed Light" charset="0"/>
+              <a:ea typeface="Abadi MT Condensed Light" charset="0"/>
+              <a:cs typeface="Abadi MT Condensed Light" charset="0"/>
+            </a:endParaRPr>
           </a:p>
         </p:txBody>
       </p:sp>

</xml_diff>